<commit_message>
[docs]se modifican caso de uso
</commit_message>
<xml_diff>
--- a/Fase_2/Documantacion_proyecto/Presentación 2-Capstone- FOCUSA.pptx
+++ b/Fase_2/Documantacion_proyecto/Presentación 2-Capstone- FOCUSA.pptx
@@ -254,8 +254,11 @@
     </a:lvl9pPr>
   </p:defaultTextStyle>
   <p:extLst>
+    <p:ext uri="{EFAFB233-063F-42B5-8137-9DF3F51BA10A}">
+      <p15:sldGuideLst xmlns:p15="http://schemas.microsoft.com/office/powerpoint/2012/main"/>
+    </p:ext>
     <p:ext uri="GoogleSlidesCustomDataVersion2">
-      <go:slidesCustomData xmlns:go="http://customooxmlschemas.google.com/" xmlns:ahyp="http://schemas.microsoft.com/office/drawing/2018/hyperlinkcolor" xmlns:p15="http://schemas.microsoft.com/office/powerpoint/2012/main" xmlns:p14="http://schemas.microsoft.com/office/powerpoint/2010/main" xmlns:com="http://schemas.openxmlformats.org/drawingml/2006/compatibility" xmlns:pvml="urn:schemas-microsoft-com:office:powerpoint" xmlns:v="urn:schemas-microsoft-com:vml" xmlns:o="urn:schemas-microsoft-com:office:office" xmlns:dgm="http://schemas.openxmlformats.org/drawingml/2006/diagram" xmlns:c="http://schemas.openxmlformats.org/drawingml/2006/chart" xmlns:mv="urn:schemas-microsoft-com:mac:vml" xmlns:mc="http://schemas.openxmlformats.org/markup-compatibility/2006" xmlns="" r:id="rId16" roundtripDataSignature="AMtx7mgQbno2VY8VgKM6mnRn2IXmwc9unQ=="/>
+      <go:slidesCustomData xmlns="" xmlns:mc="http://schemas.openxmlformats.org/markup-compatibility/2006" xmlns:mv="urn:schemas-microsoft-com:mac:vml" xmlns:c="http://schemas.openxmlformats.org/drawingml/2006/chart" xmlns:dgm="http://schemas.openxmlformats.org/drawingml/2006/diagram" xmlns:o="urn:schemas-microsoft-com:office:office" xmlns:v="urn:schemas-microsoft-com:vml" xmlns:pvml="urn:schemas-microsoft-com:office:powerpoint" xmlns:com="http://schemas.openxmlformats.org/drawingml/2006/compatibility" xmlns:p14="http://schemas.microsoft.com/office/powerpoint/2010/main" xmlns:p15="http://schemas.microsoft.com/office/powerpoint/2012/main" xmlns:ahyp="http://schemas.microsoft.com/office/drawing/2018/hyperlinkcolor" xmlns:go="http://customooxmlschemas.google.com/" r:id="rId16" roundtripDataSignature="AMtx7mgQbno2VY8VgKM6mnRn2IXmwc9unQ=="/>
     </p:ext>
   </p:extLst>
 </p:presentation>
@@ -17486,10 +17489,10 @@
       </p:sp>
       <p:pic>
         <p:nvPicPr>
-          <p:cNvPr id="3" name="Imagen 2">
+          <p:cNvPr id="2" name="Imagen 1">
             <a:extLst>
               <a:ext uri="{FF2B5EF4-FFF2-40B4-BE49-F238E27FC236}">
-                <a16:creationId xmlns:a16="http://schemas.microsoft.com/office/drawing/2014/main" id="{91EB6C18-4F6F-CA6C-7519-BE2C38DF7182}"/>
+                <a16:creationId xmlns:a16="http://schemas.microsoft.com/office/drawing/2014/main" id="{55702CD0-01E6-142A-A967-DE881413377A}"/>
               </a:ext>
             </a:extLst>
           </p:cNvPr>
@@ -17500,14 +17503,13 @@
         </p:nvPicPr>
         <p:blipFill>
           <a:blip r:embed="rId3"/>
-          <a:stretch>
-            <a:fillRect/>
-          </a:stretch>
+          <a:srcRect t="6355"/>
+          <a:stretch/>
         </p:blipFill>
         <p:spPr>
           <a:xfrm>
-            <a:off x="3559629" y="1712687"/>
-            <a:ext cx="7772400" cy="4869711"/>
+            <a:off x="4085655" y="1647948"/>
+            <a:ext cx="8083041" cy="4935732"/>
           </a:xfrm>
           <a:prstGeom prst="rect">
             <a:avLst/>
@@ -17805,10 +17807,10 @@
       </p:sp>
       <p:pic>
         <p:nvPicPr>
-          <p:cNvPr id="2" name="Imagen 1">
+          <p:cNvPr id="3" name="Imagen 2">
             <a:extLst>
               <a:ext uri="{FF2B5EF4-FFF2-40B4-BE49-F238E27FC236}">
-                <a16:creationId xmlns:a16="http://schemas.microsoft.com/office/drawing/2014/main" id="{FDFC2BC3-A4C3-1E6D-3443-0FD9A2AAA434}"/>
+                <a16:creationId xmlns:a16="http://schemas.microsoft.com/office/drawing/2014/main" id="{CBDCACE0-E1D1-9AFF-FD3B-581ABD628320}"/>
               </a:ext>
             </a:extLst>
           </p:cNvPr>
@@ -17819,14 +17821,13 @@
         </p:nvPicPr>
         <p:blipFill>
           <a:blip r:embed="rId3"/>
-          <a:stretch>
-            <a:fillRect/>
-          </a:stretch>
+          <a:srcRect l="2719" r="5515"/>
+          <a:stretch/>
         </p:blipFill>
         <p:spPr>
           <a:xfrm>
-            <a:off x="4773906" y="1300949"/>
-            <a:ext cx="6285979" cy="5176689"/>
+            <a:off x="4642339" y="869490"/>
+            <a:ext cx="7522252" cy="5709986"/>
           </a:xfrm>
           <a:prstGeom prst="rect">
             <a:avLst/>

</xml_diff>